<commit_message>
Ny analyse samt lidt oprydning
</commit_message>
<xml_diff>
--- a/ProcessBillede2.pptx
+++ b/ProcessBillede2.pptx
@@ -6,6 +6,7 @@
   </p:sldMasterIdLst>
   <p:sldIdLst>
     <p:sldId id="256" r:id="rId2"/>
+    <p:sldId id="257" r:id="rId3"/>
   </p:sldIdLst>
   <p:sldSz cx="12192000" cy="6858000"/>
   <p:notesSz cx="6858000" cy="9144000"/>
@@ -259,7 +260,7 @@
           <a:p>
             <a:fld id="{5885FD21-DBED-464B-A81B-82D7D604F54A}" type="datetimeFigureOut">
               <a:rPr lang="da-DK" smtClean="0"/>
-              <a:t>05.12.2022</a:t>
+              <a:t>29.12.2022</a:t>
             </a:fld>
             <a:endParaRPr lang="da-DK"/>
           </a:p>
@@ -457,7 +458,7 @@
           <a:p>
             <a:fld id="{5885FD21-DBED-464B-A81B-82D7D604F54A}" type="datetimeFigureOut">
               <a:rPr lang="da-DK" smtClean="0"/>
-              <a:t>05.12.2022</a:t>
+              <a:t>29.12.2022</a:t>
             </a:fld>
             <a:endParaRPr lang="da-DK"/>
           </a:p>
@@ -665,7 +666,7 @@
           <a:p>
             <a:fld id="{5885FD21-DBED-464B-A81B-82D7D604F54A}" type="datetimeFigureOut">
               <a:rPr lang="da-DK" smtClean="0"/>
-              <a:t>05.12.2022</a:t>
+              <a:t>29.12.2022</a:t>
             </a:fld>
             <a:endParaRPr lang="da-DK"/>
           </a:p>
@@ -863,7 +864,7 @@
           <a:p>
             <a:fld id="{5885FD21-DBED-464B-A81B-82D7D604F54A}" type="datetimeFigureOut">
               <a:rPr lang="da-DK" smtClean="0"/>
-              <a:t>05.12.2022</a:t>
+              <a:t>29.12.2022</a:t>
             </a:fld>
             <a:endParaRPr lang="da-DK"/>
           </a:p>
@@ -1138,7 +1139,7 @@
           <a:p>
             <a:fld id="{5885FD21-DBED-464B-A81B-82D7D604F54A}" type="datetimeFigureOut">
               <a:rPr lang="da-DK" smtClean="0"/>
-              <a:t>05.12.2022</a:t>
+              <a:t>29.12.2022</a:t>
             </a:fld>
             <a:endParaRPr lang="da-DK"/>
           </a:p>
@@ -1403,7 +1404,7 @@
           <a:p>
             <a:fld id="{5885FD21-DBED-464B-A81B-82D7D604F54A}" type="datetimeFigureOut">
               <a:rPr lang="da-DK" smtClean="0"/>
-              <a:t>05.12.2022</a:t>
+              <a:t>29.12.2022</a:t>
             </a:fld>
             <a:endParaRPr lang="da-DK"/>
           </a:p>
@@ -1815,7 +1816,7 @@
           <a:p>
             <a:fld id="{5885FD21-DBED-464B-A81B-82D7D604F54A}" type="datetimeFigureOut">
               <a:rPr lang="da-DK" smtClean="0"/>
-              <a:t>05.12.2022</a:t>
+              <a:t>29.12.2022</a:t>
             </a:fld>
             <a:endParaRPr lang="da-DK"/>
           </a:p>
@@ -1956,7 +1957,7 @@
           <a:p>
             <a:fld id="{5885FD21-DBED-464B-A81B-82D7D604F54A}" type="datetimeFigureOut">
               <a:rPr lang="da-DK" smtClean="0"/>
-              <a:t>05.12.2022</a:t>
+              <a:t>29.12.2022</a:t>
             </a:fld>
             <a:endParaRPr lang="da-DK"/>
           </a:p>
@@ -2069,7 +2070,7 @@
           <a:p>
             <a:fld id="{5885FD21-DBED-464B-A81B-82D7D604F54A}" type="datetimeFigureOut">
               <a:rPr lang="da-DK" smtClean="0"/>
-              <a:t>05.12.2022</a:t>
+              <a:t>29.12.2022</a:t>
             </a:fld>
             <a:endParaRPr lang="da-DK"/>
           </a:p>
@@ -2380,7 +2381,7 @@
           <a:p>
             <a:fld id="{5885FD21-DBED-464B-A81B-82D7D604F54A}" type="datetimeFigureOut">
               <a:rPr lang="da-DK" smtClean="0"/>
-              <a:t>05.12.2022</a:t>
+              <a:t>29.12.2022</a:t>
             </a:fld>
             <a:endParaRPr lang="da-DK"/>
           </a:p>
@@ -2668,7 +2669,7 @@
           <a:p>
             <a:fld id="{5885FD21-DBED-464B-A81B-82D7D604F54A}" type="datetimeFigureOut">
               <a:rPr lang="da-DK" smtClean="0"/>
-              <a:t>05.12.2022</a:t>
+              <a:t>29.12.2022</a:t>
             </a:fld>
             <a:endParaRPr lang="da-DK"/>
           </a:p>
@@ -2909,7 +2910,7 @@
           <a:p>
             <a:fld id="{5885FD21-DBED-464B-A81B-82D7D604F54A}" type="datetimeFigureOut">
               <a:rPr lang="da-DK" smtClean="0"/>
-              <a:t>05.12.2022</a:t>
+              <a:t>29.12.2022</a:t>
             </a:fld>
             <a:endParaRPr lang="da-DK"/>
           </a:p>
@@ -4513,6 +4514,1395 @@
 </p:sld>
 </file>
 
+<file path=ppt/slides/slide2.xml><?xml version="1.0" encoding="utf-8"?>
+<p:sld xmlns:a="http://schemas.openxmlformats.org/drawingml/2006/main" xmlns:r="http://schemas.openxmlformats.org/officeDocument/2006/relationships" xmlns:p="http://schemas.openxmlformats.org/presentationml/2006/main">
+  <p:cSld>
+    <p:spTree>
+      <p:nvGrpSpPr>
+        <p:cNvPr id="1" name=""/>
+        <p:cNvGrpSpPr/>
+        <p:nvPr/>
+      </p:nvGrpSpPr>
+      <p:grpSpPr>
+        <a:xfrm>
+          <a:off x="0" y="0"/>
+          <a:ext cx="0" cy="0"/>
+          <a:chOff x="0" y="0"/>
+          <a:chExt cx="0" cy="0"/>
+        </a:xfrm>
+      </p:grpSpPr>
+      <p:sp>
+        <p:nvSpPr>
+          <p:cNvPr id="20" name="Tekstfelt 19">
+            <a:extLst>
+              <a:ext uri="{FF2B5EF4-FFF2-40B4-BE49-F238E27FC236}">
+                <a16:creationId xmlns:a16="http://schemas.microsoft.com/office/drawing/2014/main" id="{EFDC3B74-8F61-6919-CB22-AB4A67B602EF}"/>
+              </a:ext>
+            </a:extLst>
+          </p:cNvPr>
+          <p:cNvSpPr txBox="1"/>
+          <p:nvPr/>
+        </p:nvSpPr>
+        <p:spPr>
+          <a:xfrm>
+            <a:off x="6388638" y="629827"/>
+            <a:ext cx="997700" cy="276999"/>
+          </a:xfrm>
+          <a:prstGeom prst="rect">
+            <a:avLst/>
+          </a:prstGeom>
+          <a:noFill/>
+        </p:spPr>
+        <p:txBody>
+          <a:bodyPr wrap="square" rtlCol="0">
+            <a:spAutoFit/>
+          </a:bodyPr>
+          <a:lstStyle/>
+          <a:p>
+            <a:r>
+              <a:rPr lang="da-DK" sz="1200" b="1" dirty="0"/>
+              <a:t>Cloud IAM</a:t>
+            </a:r>
+          </a:p>
+        </p:txBody>
+      </p:sp>
+      <p:sp>
+        <p:nvSpPr>
+          <p:cNvPr id="22" name="Tekstfelt 21">
+            <a:extLst>
+              <a:ext uri="{FF2B5EF4-FFF2-40B4-BE49-F238E27FC236}">
+                <a16:creationId xmlns:a16="http://schemas.microsoft.com/office/drawing/2014/main" id="{CEA73B8C-360B-AD08-219B-98FF14CF65DF}"/>
+              </a:ext>
+            </a:extLst>
+          </p:cNvPr>
+          <p:cNvSpPr txBox="1"/>
+          <p:nvPr/>
+        </p:nvSpPr>
+        <p:spPr>
+          <a:xfrm>
+            <a:off x="5251090" y="614351"/>
+            <a:ext cx="997700" cy="276999"/>
+          </a:xfrm>
+          <a:prstGeom prst="rect">
+            <a:avLst/>
+          </a:prstGeom>
+          <a:noFill/>
+        </p:spPr>
+        <p:txBody>
+          <a:bodyPr wrap="square" rtlCol="0">
+            <a:spAutoFit/>
+          </a:bodyPr>
+          <a:lstStyle/>
+          <a:p>
+            <a:r>
+              <a:rPr lang="da-DK" sz="1200" b="1" dirty="0"/>
+              <a:t>Monitoring</a:t>
+            </a:r>
+          </a:p>
+        </p:txBody>
+      </p:sp>
+      <p:sp>
+        <p:nvSpPr>
+          <p:cNvPr id="23" name="Tekstfelt 22">
+            <a:extLst>
+              <a:ext uri="{FF2B5EF4-FFF2-40B4-BE49-F238E27FC236}">
+                <a16:creationId xmlns:a16="http://schemas.microsoft.com/office/drawing/2014/main" id="{6897A201-A2E1-07B2-3C04-711BD2EAB534}"/>
+              </a:ext>
+            </a:extLst>
+          </p:cNvPr>
+          <p:cNvSpPr txBox="1"/>
+          <p:nvPr/>
+        </p:nvSpPr>
+        <p:spPr>
+          <a:xfrm>
+            <a:off x="9218560" y="4719841"/>
+            <a:ext cx="1099931" cy="276999"/>
+          </a:xfrm>
+          <a:prstGeom prst="rect">
+            <a:avLst/>
+          </a:prstGeom>
+          <a:noFill/>
+        </p:spPr>
+        <p:txBody>
+          <a:bodyPr wrap="square" rtlCol="0">
+            <a:spAutoFit/>
+          </a:bodyPr>
+          <a:lstStyle/>
+          <a:p>
+            <a:r>
+              <a:rPr lang="da-DK" sz="1200" b="1" dirty="0"/>
+              <a:t>Cloud Storage</a:t>
+            </a:r>
+          </a:p>
+        </p:txBody>
+      </p:sp>
+      <p:sp>
+        <p:nvSpPr>
+          <p:cNvPr id="33" name="Tekstfelt 32">
+            <a:extLst>
+              <a:ext uri="{FF2B5EF4-FFF2-40B4-BE49-F238E27FC236}">
+                <a16:creationId xmlns:a16="http://schemas.microsoft.com/office/drawing/2014/main" id="{6131EACB-FF27-79E4-D62B-133E9336AD02}"/>
+              </a:ext>
+            </a:extLst>
+          </p:cNvPr>
+          <p:cNvSpPr txBox="1"/>
+          <p:nvPr/>
+        </p:nvSpPr>
+        <p:spPr>
+          <a:xfrm>
+            <a:off x="-41515" y="3069512"/>
+            <a:ext cx="1930203" cy="1015663"/>
+          </a:xfrm>
+          <a:prstGeom prst="rect">
+            <a:avLst/>
+          </a:prstGeom>
+          <a:noFill/>
+        </p:spPr>
+        <p:txBody>
+          <a:bodyPr wrap="square" rtlCol="0">
+            <a:spAutoFit/>
+          </a:bodyPr>
+          <a:lstStyle/>
+          <a:p>
+            <a:r>
+              <a:rPr lang="en-GB" sz="1200" dirty="0"/>
+              <a:t>Cloud run manages the image in the container and scales the cloud infrastructure whenever it is necessary.</a:t>
+            </a:r>
+          </a:p>
+        </p:txBody>
+      </p:sp>
+      <p:cxnSp>
+        <p:nvCxnSpPr>
+          <p:cNvPr id="38" name="Lige pilforbindelse 37">
+            <a:extLst>
+              <a:ext uri="{FF2B5EF4-FFF2-40B4-BE49-F238E27FC236}">
+                <a16:creationId xmlns:a16="http://schemas.microsoft.com/office/drawing/2014/main" id="{59A39615-7878-5EDA-3791-287C0BFA1982}"/>
+              </a:ext>
+            </a:extLst>
+          </p:cNvPr>
+          <p:cNvCxnSpPr>
+            <a:cxnSpLocks/>
+          </p:cNvCxnSpPr>
+          <p:nvPr/>
+        </p:nvCxnSpPr>
+        <p:spPr>
+          <a:xfrm flipH="1" flipV="1">
+            <a:off x="1093118" y="2667025"/>
+            <a:ext cx="1278301" cy="1114008"/>
+          </a:xfrm>
+          <a:prstGeom prst="straightConnector1">
+            <a:avLst/>
+          </a:prstGeom>
+          <a:ln>
+            <a:tailEnd type="triangle"/>
+          </a:ln>
+        </p:spPr>
+        <p:style>
+          <a:lnRef idx="1">
+            <a:schemeClr val="accent1"/>
+          </a:lnRef>
+          <a:fillRef idx="0">
+            <a:schemeClr val="accent1"/>
+          </a:fillRef>
+          <a:effectRef idx="0">
+            <a:schemeClr val="accent1"/>
+          </a:effectRef>
+          <a:fontRef idx="minor">
+            <a:schemeClr val="tx1"/>
+          </a:fontRef>
+        </p:style>
+      </p:cxnSp>
+      <p:cxnSp>
+        <p:nvCxnSpPr>
+          <p:cNvPr id="40" name="Lige pilforbindelse 39">
+            <a:extLst>
+              <a:ext uri="{FF2B5EF4-FFF2-40B4-BE49-F238E27FC236}">
+                <a16:creationId xmlns:a16="http://schemas.microsoft.com/office/drawing/2014/main" id="{6D2BB216-7C66-6E73-FE5A-D738BE6514C3}"/>
+              </a:ext>
+            </a:extLst>
+          </p:cNvPr>
+          <p:cNvCxnSpPr>
+            <a:cxnSpLocks/>
+          </p:cNvCxnSpPr>
+          <p:nvPr/>
+        </p:nvCxnSpPr>
+        <p:spPr>
+          <a:xfrm>
+            <a:off x="1217614" y="1996005"/>
+            <a:ext cx="1637731" cy="0"/>
+          </a:xfrm>
+          <a:prstGeom prst="straightConnector1">
+            <a:avLst/>
+          </a:prstGeom>
+          <a:ln>
+            <a:tailEnd type="triangle"/>
+          </a:ln>
+        </p:spPr>
+        <p:style>
+          <a:lnRef idx="1">
+            <a:schemeClr val="accent1"/>
+          </a:lnRef>
+          <a:fillRef idx="0">
+            <a:schemeClr val="accent1"/>
+          </a:fillRef>
+          <a:effectRef idx="0">
+            <a:schemeClr val="accent1"/>
+          </a:effectRef>
+          <a:fontRef idx="minor">
+            <a:schemeClr val="tx1"/>
+          </a:fontRef>
+        </p:style>
+      </p:cxnSp>
+      <p:cxnSp>
+        <p:nvCxnSpPr>
+          <p:cNvPr id="42" name="Lige pilforbindelse 41">
+            <a:extLst>
+              <a:ext uri="{FF2B5EF4-FFF2-40B4-BE49-F238E27FC236}">
+                <a16:creationId xmlns:a16="http://schemas.microsoft.com/office/drawing/2014/main" id="{E7315BAA-46CE-24FD-7E1F-10B7400920FE}"/>
+              </a:ext>
+            </a:extLst>
+          </p:cNvPr>
+          <p:cNvCxnSpPr>
+            <a:cxnSpLocks/>
+          </p:cNvCxnSpPr>
+          <p:nvPr/>
+        </p:nvCxnSpPr>
+        <p:spPr>
+          <a:xfrm>
+            <a:off x="944343" y="2667025"/>
+            <a:ext cx="1282022" cy="1105935"/>
+          </a:xfrm>
+          <a:prstGeom prst="straightConnector1">
+            <a:avLst/>
+          </a:prstGeom>
+          <a:ln>
+            <a:tailEnd type="triangle"/>
+          </a:ln>
+        </p:spPr>
+        <p:style>
+          <a:lnRef idx="1">
+            <a:schemeClr val="accent1"/>
+          </a:lnRef>
+          <a:fillRef idx="0">
+            <a:schemeClr val="accent1"/>
+          </a:fillRef>
+          <a:effectRef idx="0">
+            <a:schemeClr val="accent1"/>
+          </a:effectRef>
+          <a:fontRef idx="minor">
+            <a:schemeClr val="tx1"/>
+          </a:fontRef>
+        </p:style>
+      </p:cxnSp>
+      <p:sp>
+        <p:nvSpPr>
+          <p:cNvPr id="44" name="Højre klammeparentes 43">
+            <a:extLst>
+              <a:ext uri="{FF2B5EF4-FFF2-40B4-BE49-F238E27FC236}">
+                <a16:creationId xmlns:a16="http://schemas.microsoft.com/office/drawing/2014/main" id="{3695AB4C-F370-5BB9-B133-7331D57828EB}"/>
+              </a:ext>
+            </a:extLst>
+          </p:cNvPr>
+          <p:cNvSpPr/>
+          <p:nvPr/>
+        </p:nvSpPr>
+        <p:spPr>
+          <a:xfrm rot="16200000">
+            <a:off x="6030762" y="-4289636"/>
+            <a:ext cx="368300" cy="11662635"/>
+          </a:xfrm>
+          <a:prstGeom prst="rightBrace">
+            <a:avLst/>
+          </a:prstGeom>
+        </p:spPr>
+        <p:style>
+          <a:lnRef idx="1">
+            <a:schemeClr val="accent1"/>
+          </a:lnRef>
+          <a:fillRef idx="0">
+            <a:schemeClr val="accent1"/>
+          </a:fillRef>
+          <a:effectRef idx="0">
+            <a:schemeClr val="accent1"/>
+          </a:effectRef>
+          <a:fontRef idx="minor">
+            <a:schemeClr val="tx1"/>
+          </a:fontRef>
+        </p:style>
+        <p:txBody>
+          <a:bodyPr rtlCol="0" anchor="ctr"/>
+          <a:lstStyle/>
+          <a:p>
+            <a:pPr algn="ctr"/>
+            <a:endParaRPr lang="en-GB"/>
+          </a:p>
+        </p:txBody>
+      </p:sp>
+      <p:sp>
+        <p:nvSpPr>
+          <p:cNvPr id="54" name="Tekstfelt 53">
+            <a:extLst>
+              <a:ext uri="{FF2B5EF4-FFF2-40B4-BE49-F238E27FC236}">
+                <a16:creationId xmlns:a16="http://schemas.microsoft.com/office/drawing/2014/main" id="{D084A2A4-E12D-4BB7-427B-226A3AF09526}"/>
+              </a:ext>
+            </a:extLst>
+          </p:cNvPr>
+          <p:cNvSpPr txBox="1"/>
+          <p:nvPr/>
+        </p:nvSpPr>
+        <p:spPr>
+          <a:xfrm>
+            <a:off x="4478700" y="873604"/>
+            <a:ext cx="3738853" cy="461665"/>
+          </a:xfrm>
+          <a:prstGeom prst="rect">
+            <a:avLst/>
+          </a:prstGeom>
+          <a:noFill/>
+        </p:spPr>
+        <p:txBody>
+          <a:bodyPr wrap="square" rtlCol="0">
+            <a:spAutoFit/>
+          </a:bodyPr>
+          <a:lstStyle/>
+          <a:p>
+            <a:r>
+              <a:rPr lang="en-GB" sz="1200" dirty="0"/>
+              <a:t>Monitoring allows us to keep an eye on traffic and failures. Cloud IAM help handle access using a key. </a:t>
+            </a:r>
+          </a:p>
+        </p:txBody>
+      </p:sp>
+      <p:pic>
+        <p:nvPicPr>
+          <p:cNvPr id="3" name="Billede 2">
+            <a:extLst>
+              <a:ext uri="{FF2B5EF4-FFF2-40B4-BE49-F238E27FC236}">
+                <a16:creationId xmlns:a16="http://schemas.microsoft.com/office/drawing/2014/main" id="{372DF8DE-D125-B35A-33BF-FD155E0B1A2A}"/>
+              </a:ext>
+            </a:extLst>
+          </p:cNvPr>
+          <p:cNvPicPr>
+            <a:picLocks noChangeAspect="1"/>
+          </p:cNvPicPr>
+          <p:nvPr/>
+        </p:nvPicPr>
+        <p:blipFill>
+          <a:blip r:embed="rId2"/>
+          <a:stretch>
+            <a:fillRect/>
+          </a:stretch>
+        </p:blipFill>
+        <p:spPr>
+          <a:xfrm>
+            <a:off x="2011601" y="3772960"/>
+            <a:ext cx="769661" cy="769661"/>
+          </a:xfrm>
+          <a:prstGeom prst="rect">
+            <a:avLst/>
+          </a:prstGeom>
+        </p:spPr>
+      </p:pic>
+      <p:pic>
+        <p:nvPicPr>
+          <p:cNvPr id="5" name="Billede 4">
+            <a:extLst>
+              <a:ext uri="{FF2B5EF4-FFF2-40B4-BE49-F238E27FC236}">
+                <a16:creationId xmlns:a16="http://schemas.microsoft.com/office/drawing/2014/main" id="{CA138594-224A-6376-21C0-B9870F5C68F5}"/>
+              </a:ext>
+            </a:extLst>
+          </p:cNvPr>
+          <p:cNvPicPr>
+            <a:picLocks noChangeAspect="1"/>
+          </p:cNvPicPr>
+          <p:nvPr/>
+        </p:nvPicPr>
+        <p:blipFill>
+          <a:blip r:embed="rId3"/>
+          <a:stretch>
+            <a:fillRect/>
+          </a:stretch>
+        </p:blipFill>
+        <p:spPr>
+          <a:xfrm>
+            <a:off x="9423970" y="4078808"/>
+            <a:ext cx="689113" cy="689113"/>
+          </a:xfrm>
+          <a:prstGeom prst="rect">
+            <a:avLst/>
+          </a:prstGeom>
+        </p:spPr>
+      </p:pic>
+      <p:pic>
+        <p:nvPicPr>
+          <p:cNvPr id="8" name="Billede 7">
+            <a:extLst>
+              <a:ext uri="{FF2B5EF4-FFF2-40B4-BE49-F238E27FC236}">
+                <a16:creationId xmlns:a16="http://schemas.microsoft.com/office/drawing/2014/main" id="{8F462FEA-9B02-EB04-025D-357EC493772A}"/>
+              </a:ext>
+            </a:extLst>
+          </p:cNvPr>
+          <p:cNvPicPr>
+            <a:picLocks noChangeAspect="1"/>
+          </p:cNvPicPr>
+          <p:nvPr/>
+        </p:nvPicPr>
+        <p:blipFill>
+          <a:blip r:embed="rId4"/>
+          <a:stretch>
+            <a:fillRect/>
+          </a:stretch>
+        </p:blipFill>
+        <p:spPr>
+          <a:xfrm>
+            <a:off x="3370354" y="1656889"/>
+            <a:ext cx="784730" cy="784730"/>
+          </a:xfrm>
+          <a:prstGeom prst="rect">
+            <a:avLst/>
+          </a:prstGeom>
+        </p:spPr>
+      </p:pic>
+      <p:pic>
+        <p:nvPicPr>
+          <p:cNvPr id="12" name="Billede 11">
+            <a:extLst>
+              <a:ext uri="{FF2B5EF4-FFF2-40B4-BE49-F238E27FC236}">
+                <a16:creationId xmlns:a16="http://schemas.microsoft.com/office/drawing/2014/main" id="{C48E1D1E-D193-1B2F-0213-7C283D48AB29}"/>
+              </a:ext>
+            </a:extLst>
+          </p:cNvPr>
+          <p:cNvPicPr>
+            <a:picLocks noChangeAspect="1"/>
+          </p:cNvPicPr>
+          <p:nvPr/>
+        </p:nvPicPr>
+        <p:blipFill>
+          <a:blip r:embed="rId5"/>
+          <a:stretch>
+            <a:fillRect/>
+          </a:stretch>
+        </p:blipFill>
+        <p:spPr>
+          <a:xfrm>
+            <a:off x="5232635" y="-125658"/>
+            <a:ext cx="967186" cy="999262"/>
+          </a:xfrm>
+          <a:prstGeom prst="rect">
+            <a:avLst/>
+          </a:prstGeom>
+        </p:spPr>
+      </p:pic>
+      <p:pic>
+        <p:nvPicPr>
+          <p:cNvPr id="14" name="Billede 13">
+            <a:extLst>
+              <a:ext uri="{FF2B5EF4-FFF2-40B4-BE49-F238E27FC236}">
+                <a16:creationId xmlns:a16="http://schemas.microsoft.com/office/drawing/2014/main" id="{40AB5C2B-4356-24E4-1909-D57C574C988F}"/>
+              </a:ext>
+            </a:extLst>
+          </p:cNvPr>
+          <p:cNvPicPr>
+            <a:picLocks noChangeAspect="1"/>
+          </p:cNvPicPr>
+          <p:nvPr/>
+        </p:nvPicPr>
+        <p:blipFill>
+          <a:blip r:embed="rId6"/>
+          <a:stretch>
+            <a:fillRect/>
+          </a:stretch>
+        </p:blipFill>
+        <p:spPr>
+          <a:xfrm>
+            <a:off x="493853" y="1677385"/>
+            <a:ext cx="637240" cy="637240"/>
+          </a:xfrm>
+          <a:prstGeom prst="rect">
+            <a:avLst/>
+          </a:prstGeom>
+        </p:spPr>
+      </p:pic>
+      <p:pic>
+        <p:nvPicPr>
+          <p:cNvPr id="34" name="Billede 33">
+            <a:extLst>
+              <a:ext uri="{FF2B5EF4-FFF2-40B4-BE49-F238E27FC236}">
+                <a16:creationId xmlns:a16="http://schemas.microsoft.com/office/drawing/2014/main" id="{FE4AADE2-F8EA-EADE-FB7F-66CACCE79B41}"/>
+              </a:ext>
+            </a:extLst>
+          </p:cNvPr>
+          <p:cNvPicPr>
+            <a:picLocks noChangeAspect="1"/>
+          </p:cNvPicPr>
+          <p:nvPr/>
+        </p:nvPicPr>
+        <p:blipFill>
+          <a:blip r:embed="rId7"/>
+          <a:stretch>
+            <a:fillRect/>
+          </a:stretch>
+        </p:blipFill>
+        <p:spPr>
+          <a:xfrm>
+            <a:off x="6444356" y="-15520"/>
+            <a:ext cx="736600" cy="736600"/>
+          </a:xfrm>
+          <a:prstGeom prst="rect">
+            <a:avLst/>
+          </a:prstGeom>
+        </p:spPr>
+      </p:pic>
+      <p:sp>
+        <p:nvSpPr>
+          <p:cNvPr id="55" name="Tekstfelt 54">
+            <a:extLst>
+              <a:ext uri="{FF2B5EF4-FFF2-40B4-BE49-F238E27FC236}">
+                <a16:creationId xmlns:a16="http://schemas.microsoft.com/office/drawing/2014/main" id="{F7DAA1BB-D745-EAD2-07C9-C795899989B1}"/>
+              </a:ext>
+            </a:extLst>
+          </p:cNvPr>
+          <p:cNvSpPr txBox="1"/>
+          <p:nvPr/>
+        </p:nvSpPr>
+        <p:spPr>
+          <a:xfrm>
+            <a:off x="321057" y="2275481"/>
+            <a:ext cx="997700" cy="276999"/>
+          </a:xfrm>
+          <a:prstGeom prst="rect">
+            <a:avLst/>
+          </a:prstGeom>
+          <a:noFill/>
+        </p:spPr>
+        <p:txBody>
+          <a:bodyPr wrap="square" rtlCol="0">
+            <a:spAutoFit/>
+          </a:bodyPr>
+          <a:lstStyle/>
+          <a:p>
+            <a:r>
+              <a:rPr lang="da-DK" sz="1200" b="1" dirty="0"/>
+              <a:t>Cloud Run</a:t>
+            </a:r>
+          </a:p>
+        </p:txBody>
+      </p:sp>
+      <p:sp>
+        <p:nvSpPr>
+          <p:cNvPr id="58" name="Tekstfelt 57">
+            <a:extLst>
+              <a:ext uri="{FF2B5EF4-FFF2-40B4-BE49-F238E27FC236}">
+                <a16:creationId xmlns:a16="http://schemas.microsoft.com/office/drawing/2014/main" id="{E53B6863-70A0-E3C2-228A-9657F744A38E}"/>
+              </a:ext>
+            </a:extLst>
+          </p:cNvPr>
+          <p:cNvSpPr txBox="1"/>
+          <p:nvPr/>
+        </p:nvSpPr>
+        <p:spPr>
+          <a:xfrm>
+            <a:off x="1758772" y="4500851"/>
+            <a:ext cx="1351766" cy="276999"/>
+          </a:xfrm>
+          <a:prstGeom prst="rect">
+            <a:avLst/>
+          </a:prstGeom>
+          <a:noFill/>
+        </p:spPr>
+        <p:txBody>
+          <a:bodyPr wrap="square" rtlCol="0">
+            <a:spAutoFit/>
+          </a:bodyPr>
+          <a:lstStyle/>
+          <a:p>
+            <a:r>
+              <a:rPr lang="da-DK" sz="1200" b="1" dirty="0"/>
+              <a:t>Container Registry</a:t>
+            </a:r>
+          </a:p>
+        </p:txBody>
+      </p:sp>
+      <p:sp>
+        <p:nvSpPr>
+          <p:cNvPr id="41" name="Tekstfelt 40">
+            <a:extLst>
+              <a:ext uri="{FF2B5EF4-FFF2-40B4-BE49-F238E27FC236}">
+                <a16:creationId xmlns:a16="http://schemas.microsoft.com/office/drawing/2014/main" id="{99DD5EBF-8E39-94CC-AE25-8C35CDA6A7EE}"/>
+              </a:ext>
+            </a:extLst>
+          </p:cNvPr>
+          <p:cNvSpPr txBox="1"/>
+          <p:nvPr/>
+        </p:nvSpPr>
+        <p:spPr>
+          <a:xfrm>
+            <a:off x="2729752" y="3853656"/>
+            <a:ext cx="2119535" cy="646331"/>
+          </a:xfrm>
+          <a:prstGeom prst="rect">
+            <a:avLst/>
+          </a:prstGeom>
+          <a:noFill/>
+        </p:spPr>
+        <p:txBody>
+          <a:bodyPr wrap="square" rtlCol="0">
+            <a:spAutoFit/>
+          </a:bodyPr>
+          <a:lstStyle/>
+          <a:p>
+            <a:r>
+              <a:rPr lang="en-GB" sz="1200" dirty="0"/>
+              <a:t>The docker image have been uploaded to Container Registry.</a:t>
+            </a:r>
+          </a:p>
+        </p:txBody>
+      </p:sp>
+      <p:sp>
+        <p:nvSpPr>
+          <p:cNvPr id="63" name="Tekstfelt 62">
+            <a:extLst>
+              <a:ext uri="{FF2B5EF4-FFF2-40B4-BE49-F238E27FC236}">
+                <a16:creationId xmlns:a16="http://schemas.microsoft.com/office/drawing/2014/main" id="{7BF81820-9359-92F4-0A6C-F290714318F9}"/>
+              </a:ext>
+            </a:extLst>
+          </p:cNvPr>
+          <p:cNvSpPr txBox="1"/>
+          <p:nvPr/>
+        </p:nvSpPr>
+        <p:spPr>
+          <a:xfrm>
+            <a:off x="3227036" y="2390026"/>
+            <a:ext cx="1387111" cy="276999"/>
+          </a:xfrm>
+          <a:prstGeom prst="rect">
+            <a:avLst/>
+          </a:prstGeom>
+          <a:noFill/>
+        </p:spPr>
+        <p:txBody>
+          <a:bodyPr wrap="square" rtlCol="0">
+            <a:spAutoFit/>
+          </a:bodyPr>
+          <a:lstStyle/>
+          <a:p>
+            <a:r>
+              <a:rPr lang="da-DK" sz="1200" b="1" dirty="0"/>
+              <a:t>Compute Engine</a:t>
+            </a:r>
+          </a:p>
+        </p:txBody>
+      </p:sp>
+      <p:cxnSp>
+        <p:nvCxnSpPr>
+          <p:cNvPr id="68" name="Lige pilforbindelse 67">
+            <a:extLst>
+              <a:ext uri="{FF2B5EF4-FFF2-40B4-BE49-F238E27FC236}">
+                <a16:creationId xmlns:a16="http://schemas.microsoft.com/office/drawing/2014/main" id="{85527A1E-3E13-7DFE-6FA7-71FA27BC871E}"/>
+              </a:ext>
+            </a:extLst>
+          </p:cNvPr>
+          <p:cNvCxnSpPr>
+            <a:cxnSpLocks/>
+          </p:cNvCxnSpPr>
+          <p:nvPr/>
+        </p:nvCxnSpPr>
+        <p:spPr>
+          <a:xfrm>
+            <a:off x="321057" y="5304736"/>
+            <a:ext cx="11493873" cy="0"/>
+          </a:xfrm>
+          <a:prstGeom prst="straightConnector1">
+            <a:avLst/>
+          </a:prstGeom>
+          <a:ln>
+            <a:tailEnd type="triangle"/>
+          </a:ln>
+        </p:spPr>
+        <p:style>
+          <a:lnRef idx="1">
+            <a:schemeClr val="accent1"/>
+          </a:lnRef>
+          <a:fillRef idx="0">
+            <a:schemeClr val="accent1"/>
+          </a:fillRef>
+          <a:effectRef idx="0">
+            <a:schemeClr val="accent1"/>
+          </a:effectRef>
+          <a:fontRef idx="minor">
+            <a:schemeClr val="tx1"/>
+          </a:fontRef>
+        </p:style>
+      </p:cxnSp>
+      <p:sp>
+        <p:nvSpPr>
+          <p:cNvPr id="70" name="Tekstfelt 69">
+            <a:extLst>
+              <a:ext uri="{FF2B5EF4-FFF2-40B4-BE49-F238E27FC236}">
+                <a16:creationId xmlns:a16="http://schemas.microsoft.com/office/drawing/2014/main" id="{2C760611-0E1F-A7C6-0DBC-86B2FB654E0E}"/>
+              </a:ext>
+            </a:extLst>
+          </p:cNvPr>
+          <p:cNvSpPr txBox="1"/>
+          <p:nvPr/>
+        </p:nvSpPr>
+        <p:spPr>
+          <a:xfrm>
+            <a:off x="5332644" y="5500469"/>
+            <a:ext cx="1338469" cy="338554"/>
+          </a:xfrm>
+          <a:prstGeom prst="rect">
+            <a:avLst/>
+          </a:prstGeom>
+          <a:noFill/>
+        </p:spPr>
+        <p:txBody>
+          <a:bodyPr wrap="square" rtlCol="0">
+            <a:spAutoFit/>
+          </a:bodyPr>
+          <a:lstStyle/>
+          <a:p>
+            <a:r>
+              <a:rPr lang="en-GB" sz="1600" dirty="0"/>
+              <a:t>Timeline</a:t>
+            </a:r>
+          </a:p>
+        </p:txBody>
+      </p:sp>
+      <p:sp>
+        <p:nvSpPr>
+          <p:cNvPr id="71" name="Tekstfelt 70">
+            <a:extLst>
+              <a:ext uri="{FF2B5EF4-FFF2-40B4-BE49-F238E27FC236}">
+                <a16:creationId xmlns:a16="http://schemas.microsoft.com/office/drawing/2014/main" id="{6D05E6BF-8114-8A68-0784-326ADE5BE37B}"/>
+              </a:ext>
+            </a:extLst>
+          </p:cNvPr>
+          <p:cNvSpPr txBox="1"/>
+          <p:nvPr/>
+        </p:nvSpPr>
+        <p:spPr>
+          <a:xfrm>
+            <a:off x="1229407" y="2002555"/>
+            <a:ext cx="2146658" cy="830997"/>
+          </a:xfrm>
+          <a:prstGeom prst="rect">
+            <a:avLst/>
+          </a:prstGeom>
+          <a:noFill/>
+        </p:spPr>
+        <p:txBody>
+          <a:bodyPr wrap="square" rtlCol="0">
+            <a:spAutoFit/>
+          </a:bodyPr>
+          <a:lstStyle/>
+          <a:p>
+            <a:r>
+              <a:rPr lang="en-GB" sz="1200" dirty="0"/>
+              <a:t>Cloud run starts an compute engine (virtual machine), which unfolds the docker image, and hosts the application.</a:t>
+            </a:r>
+          </a:p>
+        </p:txBody>
+      </p:sp>
+      <p:cxnSp>
+        <p:nvCxnSpPr>
+          <p:cNvPr id="73" name="Lige pilforbindelse 72">
+            <a:extLst>
+              <a:ext uri="{FF2B5EF4-FFF2-40B4-BE49-F238E27FC236}">
+                <a16:creationId xmlns:a16="http://schemas.microsoft.com/office/drawing/2014/main" id="{9F91DAE1-CE56-6F62-3CC9-D9A1EF27DDC4}"/>
+              </a:ext>
+            </a:extLst>
+          </p:cNvPr>
+          <p:cNvCxnSpPr>
+            <a:cxnSpLocks/>
+          </p:cNvCxnSpPr>
+          <p:nvPr/>
+        </p:nvCxnSpPr>
+        <p:spPr>
+          <a:xfrm>
+            <a:off x="4165530" y="2002555"/>
+            <a:ext cx="2107765" cy="0"/>
+          </a:xfrm>
+          <a:prstGeom prst="straightConnector1">
+            <a:avLst/>
+          </a:prstGeom>
+          <a:ln>
+            <a:tailEnd type="triangle"/>
+          </a:ln>
+        </p:spPr>
+        <p:style>
+          <a:lnRef idx="1">
+            <a:schemeClr val="accent1"/>
+          </a:lnRef>
+          <a:fillRef idx="0">
+            <a:schemeClr val="accent1"/>
+          </a:fillRef>
+          <a:effectRef idx="0">
+            <a:schemeClr val="accent1"/>
+          </a:effectRef>
+          <a:fontRef idx="minor">
+            <a:schemeClr val="tx1"/>
+          </a:fontRef>
+        </p:style>
+      </p:cxnSp>
+      <p:pic>
+        <p:nvPicPr>
+          <p:cNvPr id="75" name="Grafik 74">
+            <a:extLst>
+              <a:ext uri="{FF2B5EF4-FFF2-40B4-BE49-F238E27FC236}">
+                <a16:creationId xmlns:a16="http://schemas.microsoft.com/office/drawing/2014/main" id="{A4E401C6-D69C-6161-84A1-E63390A226DD}"/>
+              </a:ext>
+            </a:extLst>
+          </p:cNvPr>
+          <p:cNvPicPr>
+            <a:picLocks noChangeAspect="1"/>
+          </p:cNvPicPr>
+          <p:nvPr/>
+        </p:nvPicPr>
+        <p:blipFill rotWithShape="1">
+          <a:blip r:embed="rId8">
+            <a:extLst>
+              <a:ext uri="{96DAC541-7B7A-43D3-8B79-37D633B846F1}">
+                <asvg:svgBlip xmlns:asvg="http://schemas.microsoft.com/office/drawing/2016/SVG/main" r:embed="rId9"/>
+              </a:ext>
+            </a:extLst>
+          </a:blip>
+          <a:srcRect l="6598" t="33829" r="67845" b="38188"/>
+          <a:stretch/>
+        </p:blipFill>
+        <p:spPr>
+          <a:xfrm>
+            <a:off x="6348127" y="1531718"/>
+            <a:ext cx="950401" cy="1040629"/>
+          </a:xfrm>
+          <a:prstGeom prst="rect">
+            <a:avLst/>
+          </a:prstGeom>
+        </p:spPr>
+      </p:pic>
+      <p:sp>
+        <p:nvSpPr>
+          <p:cNvPr id="76" name="Tekstfelt 75">
+            <a:extLst>
+              <a:ext uri="{FF2B5EF4-FFF2-40B4-BE49-F238E27FC236}">
+                <a16:creationId xmlns:a16="http://schemas.microsoft.com/office/drawing/2014/main" id="{430A4FE0-6858-953A-C02E-30180D873740}"/>
+              </a:ext>
+            </a:extLst>
+          </p:cNvPr>
+          <p:cNvSpPr txBox="1"/>
+          <p:nvPr/>
+        </p:nvSpPr>
+        <p:spPr>
+          <a:xfrm>
+            <a:off x="5997927" y="2429837"/>
+            <a:ext cx="1698100" cy="646331"/>
+          </a:xfrm>
+          <a:prstGeom prst="rect">
+            <a:avLst/>
+          </a:prstGeom>
+          <a:noFill/>
+        </p:spPr>
+        <p:txBody>
+          <a:bodyPr wrap="square" rtlCol="0">
+            <a:spAutoFit/>
+          </a:bodyPr>
+          <a:lstStyle/>
+          <a:p>
+            <a:r>
+              <a:rPr lang="en-GB" sz="1200" b="1" dirty="0"/>
+              <a:t>Application</a:t>
+            </a:r>
+            <a:r>
+              <a:rPr lang="en-GB" sz="1200" dirty="0"/>
+              <a:t> created in python using the streamlit library</a:t>
+            </a:r>
+          </a:p>
+        </p:txBody>
+      </p:sp>
+      <p:sp>
+        <p:nvSpPr>
+          <p:cNvPr id="77" name="Smilende ansigt 76">
+            <a:extLst>
+              <a:ext uri="{FF2B5EF4-FFF2-40B4-BE49-F238E27FC236}">
+                <a16:creationId xmlns:a16="http://schemas.microsoft.com/office/drawing/2014/main" id="{1DD6F2F8-48AB-9DC4-A79E-3F9C5A5DE42F}"/>
+              </a:ext>
+            </a:extLst>
+          </p:cNvPr>
+          <p:cNvSpPr/>
+          <p:nvPr/>
+        </p:nvSpPr>
+        <p:spPr>
+          <a:xfrm>
+            <a:off x="8328531" y="3755643"/>
+            <a:ext cx="633785" cy="646331"/>
+          </a:xfrm>
+          <a:prstGeom prst="smileyFace">
+            <a:avLst/>
+          </a:prstGeom>
+          <a:solidFill>
+            <a:srgbClr val="00B0F0"/>
+          </a:solidFill>
+          <a:ln>
+            <a:solidFill>
+              <a:schemeClr val="bg1"/>
+            </a:solidFill>
+          </a:ln>
+        </p:spPr>
+        <p:style>
+          <a:lnRef idx="2">
+            <a:schemeClr val="accent1">
+              <a:shade val="50000"/>
+            </a:schemeClr>
+          </a:lnRef>
+          <a:fillRef idx="1">
+            <a:schemeClr val="accent1"/>
+          </a:fillRef>
+          <a:effectRef idx="0">
+            <a:schemeClr val="accent1"/>
+          </a:effectRef>
+          <a:fontRef idx="minor">
+            <a:schemeClr val="lt1"/>
+          </a:fontRef>
+        </p:style>
+        <p:txBody>
+          <a:bodyPr rtlCol="0" anchor="ctr"/>
+          <a:lstStyle/>
+          <a:p>
+            <a:pPr algn="ctr"/>
+            <a:endParaRPr lang="en-GB"/>
+          </a:p>
+        </p:txBody>
+      </p:sp>
+      <p:sp>
+        <p:nvSpPr>
+          <p:cNvPr id="80" name="Tekstfelt 79">
+            <a:extLst>
+              <a:ext uri="{FF2B5EF4-FFF2-40B4-BE49-F238E27FC236}">
+                <a16:creationId xmlns:a16="http://schemas.microsoft.com/office/drawing/2014/main" id="{5EEB2207-3A22-CAF7-F041-0ED783D8F487}"/>
+              </a:ext>
+            </a:extLst>
+          </p:cNvPr>
+          <p:cNvSpPr txBox="1"/>
+          <p:nvPr/>
+        </p:nvSpPr>
+        <p:spPr>
+          <a:xfrm>
+            <a:off x="4405769" y="2060291"/>
+            <a:ext cx="1830777" cy="830997"/>
+          </a:xfrm>
+          <a:prstGeom prst="rect">
+            <a:avLst/>
+          </a:prstGeom>
+          <a:noFill/>
+        </p:spPr>
+        <p:txBody>
+          <a:bodyPr wrap="square" rtlCol="0">
+            <a:spAutoFit/>
+          </a:bodyPr>
+          <a:lstStyle/>
+          <a:p>
+            <a:r>
+              <a:rPr lang="en-GB" sz="1200" dirty="0"/>
+              <a:t>Compute engine will run the python script and other commands in the docker container.</a:t>
+            </a:r>
+          </a:p>
+        </p:txBody>
+      </p:sp>
+      <p:cxnSp>
+        <p:nvCxnSpPr>
+          <p:cNvPr id="83" name="Lige pilforbindelse 82">
+            <a:extLst>
+              <a:ext uri="{FF2B5EF4-FFF2-40B4-BE49-F238E27FC236}">
+                <a16:creationId xmlns:a16="http://schemas.microsoft.com/office/drawing/2014/main" id="{D1FDF100-7A6A-85C4-FEA0-4C4734C4898D}"/>
+              </a:ext>
+            </a:extLst>
+          </p:cNvPr>
+          <p:cNvCxnSpPr>
+            <a:cxnSpLocks/>
+          </p:cNvCxnSpPr>
+          <p:nvPr/>
+        </p:nvCxnSpPr>
+        <p:spPr>
+          <a:xfrm flipH="1" flipV="1">
+            <a:off x="7298528" y="2314625"/>
+            <a:ext cx="1204234" cy="1329723"/>
+          </a:xfrm>
+          <a:prstGeom prst="straightConnector1">
+            <a:avLst/>
+          </a:prstGeom>
+          <a:ln>
+            <a:tailEnd type="triangle"/>
+          </a:ln>
+        </p:spPr>
+        <p:style>
+          <a:lnRef idx="1">
+            <a:schemeClr val="accent1"/>
+          </a:lnRef>
+          <a:fillRef idx="0">
+            <a:schemeClr val="accent1"/>
+          </a:fillRef>
+          <a:effectRef idx="0">
+            <a:schemeClr val="accent1"/>
+          </a:effectRef>
+          <a:fontRef idx="minor">
+            <a:schemeClr val="tx1"/>
+          </a:fontRef>
+        </p:style>
+      </p:cxnSp>
+      <p:sp>
+        <p:nvSpPr>
+          <p:cNvPr id="85" name="Tekstfelt 84">
+            <a:extLst>
+              <a:ext uri="{FF2B5EF4-FFF2-40B4-BE49-F238E27FC236}">
+                <a16:creationId xmlns:a16="http://schemas.microsoft.com/office/drawing/2014/main" id="{8606E4D9-2F29-F8F4-B95F-322AD0898857}"/>
+              </a:ext>
+            </a:extLst>
+          </p:cNvPr>
+          <p:cNvSpPr txBox="1"/>
+          <p:nvPr/>
+        </p:nvSpPr>
+        <p:spPr>
+          <a:xfrm>
+            <a:off x="8374334" y="4442266"/>
+            <a:ext cx="949021" cy="276999"/>
+          </a:xfrm>
+          <a:prstGeom prst="rect">
+            <a:avLst/>
+          </a:prstGeom>
+          <a:noFill/>
+        </p:spPr>
+        <p:txBody>
+          <a:bodyPr wrap="square" rtlCol="0">
+            <a:spAutoFit/>
+          </a:bodyPr>
+          <a:lstStyle/>
+          <a:p>
+            <a:r>
+              <a:rPr lang="en-GB" sz="1200" b="1" dirty="0"/>
+              <a:t>User</a:t>
+            </a:r>
+          </a:p>
+        </p:txBody>
+      </p:sp>
+      <p:sp>
+        <p:nvSpPr>
+          <p:cNvPr id="86" name="Tekstfelt 85">
+            <a:extLst>
+              <a:ext uri="{FF2B5EF4-FFF2-40B4-BE49-F238E27FC236}">
+                <a16:creationId xmlns:a16="http://schemas.microsoft.com/office/drawing/2014/main" id="{118A0D7E-7AB9-00C6-5960-7A728B2B3805}"/>
+              </a:ext>
+            </a:extLst>
+          </p:cNvPr>
+          <p:cNvSpPr txBox="1"/>
+          <p:nvPr/>
+        </p:nvSpPr>
+        <p:spPr>
+          <a:xfrm>
+            <a:off x="6767222" y="3148024"/>
+            <a:ext cx="1474194" cy="1200329"/>
+          </a:xfrm>
+          <a:prstGeom prst="rect">
+            <a:avLst/>
+          </a:prstGeom>
+          <a:noFill/>
+        </p:spPr>
+        <p:txBody>
+          <a:bodyPr wrap="square" rtlCol="0">
+            <a:spAutoFit/>
+          </a:bodyPr>
+          <a:lstStyle/>
+          <a:p>
+            <a:r>
+              <a:rPr lang="en-GB" sz="1200" dirty="0"/>
+              <a:t>User react with the application by supplying a customer id and a desired amount of recommendations</a:t>
+            </a:r>
+          </a:p>
+        </p:txBody>
+      </p:sp>
+      <p:cxnSp>
+        <p:nvCxnSpPr>
+          <p:cNvPr id="89" name="Lige pilforbindelse 88">
+            <a:extLst>
+              <a:ext uri="{FF2B5EF4-FFF2-40B4-BE49-F238E27FC236}">
+                <a16:creationId xmlns:a16="http://schemas.microsoft.com/office/drawing/2014/main" id="{FC8F0E1E-1415-66FC-D432-7190A94E6394}"/>
+              </a:ext>
+            </a:extLst>
+          </p:cNvPr>
+          <p:cNvCxnSpPr/>
+          <p:nvPr/>
+        </p:nvCxnSpPr>
+        <p:spPr>
+          <a:xfrm>
+            <a:off x="7504319" y="2049254"/>
+            <a:ext cx="2157429" cy="2029554"/>
+          </a:xfrm>
+          <a:prstGeom prst="straightConnector1">
+            <a:avLst/>
+          </a:prstGeom>
+          <a:ln>
+            <a:tailEnd type="triangle"/>
+          </a:ln>
+        </p:spPr>
+        <p:style>
+          <a:lnRef idx="1">
+            <a:schemeClr val="accent1"/>
+          </a:lnRef>
+          <a:fillRef idx="0">
+            <a:schemeClr val="accent1"/>
+          </a:fillRef>
+          <a:effectRef idx="0">
+            <a:schemeClr val="accent1"/>
+          </a:effectRef>
+          <a:fontRef idx="minor">
+            <a:schemeClr val="tx1"/>
+          </a:fontRef>
+        </p:style>
+      </p:cxnSp>
+      <p:cxnSp>
+        <p:nvCxnSpPr>
+          <p:cNvPr id="91" name="Lige pilforbindelse 90">
+            <a:extLst>
+              <a:ext uri="{FF2B5EF4-FFF2-40B4-BE49-F238E27FC236}">
+                <a16:creationId xmlns:a16="http://schemas.microsoft.com/office/drawing/2014/main" id="{3DFD6F73-9525-11E1-6A1F-040D9EC37A42}"/>
+              </a:ext>
+            </a:extLst>
+          </p:cNvPr>
+          <p:cNvCxnSpPr>
+            <a:cxnSpLocks/>
+          </p:cNvCxnSpPr>
+          <p:nvPr/>
+        </p:nvCxnSpPr>
+        <p:spPr>
+          <a:xfrm flipH="1" flipV="1">
+            <a:off x="7444525" y="2155700"/>
+            <a:ext cx="2047046" cy="1915929"/>
+          </a:xfrm>
+          <a:prstGeom prst="straightConnector1">
+            <a:avLst/>
+          </a:prstGeom>
+          <a:ln>
+            <a:tailEnd type="triangle"/>
+          </a:ln>
+        </p:spPr>
+        <p:style>
+          <a:lnRef idx="1">
+            <a:schemeClr val="accent1"/>
+          </a:lnRef>
+          <a:fillRef idx="0">
+            <a:schemeClr val="accent1"/>
+          </a:fillRef>
+          <a:effectRef idx="0">
+            <a:schemeClr val="accent1"/>
+          </a:effectRef>
+          <a:fontRef idx="minor">
+            <a:schemeClr val="tx1"/>
+          </a:fontRef>
+        </p:style>
+      </p:cxnSp>
+      <p:sp>
+        <p:nvSpPr>
+          <p:cNvPr id="94" name="Tekstfelt 93">
+            <a:extLst>
+              <a:ext uri="{FF2B5EF4-FFF2-40B4-BE49-F238E27FC236}">
+                <a16:creationId xmlns:a16="http://schemas.microsoft.com/office/drawing/2014/main" id="{F6980475-C178-9FAF-2553-AB36728E878B}"/>
+              </a:ext>
+            </a:extLst>
+          </p:cNvPr>
+          <p:cNvSpPr txBox="1"/>
+          <p:nvPr/>
+        </p:nvSpPr>
+        <p:spPr>
+          <a:xfrm>
+            <a:off x="8729845" y="2730499"/>
+            <a:ext cx="1523451" cy="646331"/>
+          </a:xfrm>
+          <a:prstGeom prst="rect">
+            <a:avLst/>
+          </a:prstGeom>
+          <a:noFill/>
+        </p:spPr>
+        <p:txBody>
+          <a:bodyPr wrap="square" rtlCol="0">
+            <a:spAutoFit/>
+          </a:bodyPr>
+          <a:lstStyle/>
+          <a:p>
+            <a:r>
+              <a:rPr lang="en-GB" sz="1200" dirty="0"/>
+              <a:t>The python script requests and receives data and models</a:t>
+            </a:r>
+          </a:p>
+        </p:txBody>
+      </p:sp>
+      <p:cxnSp>
+        <p:nvCxnSpPr>
+          <p:cNvPr id="96" name="Lige pilforbindelse 95">
+            <a:extLst>
+              <a:ext uri="{FF2B5EF4-FFF2-40B4-BE49-F238E27FC236}">
+                <a16:creationId xmlns:a16="http://schemas.microsoft.com/office/drawing/2014/main" id="{9273D0A9-EF3B-DF73-977C-8EEC06AA69CD}"/>
+              </a:ext>
+            </a:extLst>
+          </p:cNvPr>
+          <p:cNvCxnSpPr>
+            <a:cxnSpLocks/>
+          </p:cNvCxnSpPr>
+          <p:nvPr/>
+        </p:nvCxnSpPr>
+        <p:spPr>
+          <a:xfrm>
+            <a:off x="7504319" y="1996005"/>
+            <a:ext cx="3256446" cy="20509"/>
+          </a:xfrm>
+          <a:prstGeom prst="straightConnector1">
+            <a:avLst/>
+          </a:prstGeom>
+          <a:ln>
+            <a:tailEnd type="triangle"/>
+          </a:ln>
+        </p:spPr>
+        <p:style>
+          <a:lnRef idx="1">
+            <a:schemeClr val="accent1"/>
+          </a:lnRef>
+          <a:fillRef idx="0">
+            <a:schemeClr val="accent1"/>
+          </a:fillRef>
+          <a:effectRef idx="0">
+            <a:schemeClr val="accent1"/>
+          </a:effectRef>
+          <a:fontRef idx="minor">
+            <a:schemeClr val="tx1"/>
+          </a:fontRef>
+        </p:style>
+      </p:cxnSp>
+      <p:pic>
+        <p:nvPicPr>
+          <p:cNvPr id="97" name="Billede 96">
+            <a:extLst>
+              <a:ext uri="{FF2B5EF4-FFF2-40B4-BE49-F238E27FC236}">
+                <a16:creationId xmlns:a16="http://schemas.microsoft.com/office/drawing/2014/main" id="{F3E7B9AC-A40E-34C6-904B-FD67E6589B18}"/>
+              </a:ext>
+            </a:extLst>
+          </p:cNvPr>
+          <p:cNvPicPr>
+            <a:picLocks noChangeAspect="1"/>
+          </p:cNvPicPr>
+          <p:nvPr/>
+        </p:nvPicPr>
+        <p:blipFill rotWithShape="1">
+          <a:blip r:embed="rId10">
+            <a:extLst>
+              <a:ext uri="{BEBA8EAE-BF5A-486C-A8C5-ECC9F3942E4B}">
+                <a14:imgProps xmlns:a14="http://schemas.microsoft.com/office/drawing/2010/main">
+                  <a14:imgLayer r:embed="rId11">
+                    <a14:imgEffect>
+                      <a14:saturation sat="400000"/>
+                    </a14:imgEffect>
+                  </a14:imgLayer>
+                </a14:imgProps>
+              </a:ext>
+            </a:extLst>
+          </a:blip>
+          <a:srcRect l="21979" r="18994"/>
+          <a:stretch/>
+        </p:blipFill>
+        <p:spPr>
+          <a:xfrm>
+            <a:off x="10878353" y="1651091"/>
+            <a:ext cx="644102" cy="818399"/>
+          </a:xfrm>
+          <a:prstGeom prst="rect">
+            <a:avLst/>
+          </a:prstGeom>
+        </p:spPr>
+      </p:pic>
+      <p:sp>
+        <p:nvSpPr>
+          <p:cNvPr id="98" name="Tekstfelt 97">
+            <a:extLst>
+              <a:ext uri="{FF2B5EF4-FFF2-40B4-BE49-F238E27FC236}">
+                <a16:creationId xmlns:a16="http://schemas.microsoft.com/office/drawing/2014/main" id="{FBBB356F-3E21-EAB3-29AC-06BA221A3C07}"/>
+              </a:ext>
+            </a:extLst>
+          </p:cNvPr>
+          <p:cNvSpPr txBox="1"/>
+          <p:nvPr/>
+        </p:nvSpPr>
+        <p:spPr>
+          <a:xfrm>
+            <a:off x="8562556" y="1984178"/>
+            <a:ext cx="1616765" cy="646331"/>
+          </a:xfrm>
+          <a:prstGeom prst="rect">
+            <a:avLst/>
+          </a:prstGeom>
+          <a:noFill/>
+        </p:spPr>
+        <p:txBody>
+          <a:bodyPr wrap="square" rtlCol="0">
+            <a:spAutoFit/>
+          </a:bodyPr>
+          <a:lstStyle/>
+          <a:p>
+            <a:r>
+              <a:rPr lang="en-GB" sz="1200" dirty="0"/>
+              <a:t>Relevant recommendations are made for the user</a:t>
+            </a:r>
+          </a:p>
+        </p:txBody>
+      </p:sp>
+      <p:sp>
+        <p:nvSpPr>
+          <p:cNvPr id="99" name="Tekstfelt 98">
+            <a:extLst>
+              <a:ext uri="{FF2B5EF4-FFF2-40B4-BE49-F238E27FC236}">
+                <a16:creationId xmlns:a16="http://schemas.microsoft.com/office/drawing/2014/main" id="{A02793AE-CBD9-B158-F3F2-C3C5EA48B172}"/>
+              </a:ext>
+            </a:extLst>
+          </p:cNvPr>
+          <p:cNvSpPr txBox="1"/>
+          <p:nvPr/>
+        </p:nvSpPr>
+        <p:spPr>
+          <a:xfrm>
+            <a:off x="10179321" y="2413980"/>
+            <a:ext cx="1950628" cy="276999"/>
+          </a:xfrm>
+          <a:prstGeom prst="rect">
+            <a:avLst/>
+          </a:prstGeom>
+          <a:noFill/>
+        </p:spPr>
+        <p:txBody>
+          <a:bodyPr wrap="square" rtlCol="0">
+            <a:spAutoFit/>
+          </a:bodyPr>
+          <a:lstStyle/>
+          <a:p>
+            <a:r>
+              <a:rPr lang="en-GB" sz="1200" dirty="0"/>
+              <a:t>Relevant</a:t>
+            </a:r>
+            <a:r>
+              <a:rPr lang="en-GB" sz="1200" b="1" dirty="0"/>
+              <a:t> recommendations</a:t>
+            </a:r>
+          </a:p>
+        </p:txBody>
+      </p:sp>
+    </p:spTree>
+    <p:extLst>
+      <p:ext uri="{BB962C8B-B14F-4D97-AF65-F5344CB8AC3E}">
+        <p14:creationId xmlns:p14="http://schemas.microsoft.com/office/powerpoint/2010/main" val="4094744847"/>
+      </p:ext>
+    </p:extLst>
+  </p:cSld>
+  <p:clrMapOvr>
+    <a:masterClrMapping/>
+  </p:clrMapOvr>
+</p:sld>
+</file>
+
 <file path=ppt/theme/theme1.xml><?xml version="1.0" encoding="utf-8"?>
 <a:theme xmlns:a="http://schemas.openxmlformats.org/drawingml/2006/main" name="Office-tema">
   <a:themeElements>

</xml_diff>